<commit_message>
Deploying to gh-pages from @ YoungJIn94/YoungJIn94.github.io@0d426822090a2b8f43318bad64a7d9b1327e4d73 🚀
</commit_message>
<xml_diff>
--- a/assets/img/publication_preview/AchroGrating.pptx
+++ b/assets/img/publication_preview/AchroGrating.pptx
@@ -5,19 +5,20 @@
     <p:sldMasterId id="2147483648" r:id="rId1"/>
   </p:sldMasterIdLst>
   <p:notesMasterIdLst>
-    <p:notesMasterId r:id="rId3"/>
+    <p:notesMasterId r:id="rId4"/>
   </p:notesMasterIdLst>
   <p:sldIdLst>
     <p:sldId id="256" r:id="rId2"/>
+    <p:sldId id="257" r:id="rId3"/>
   </p:sldIdLst>
-  <p:sldSz cx="3671888" cy="3959225"/>
+  <p:sldSz cx="3600450" cy="3600450"/>
   <p:notesSz cx="7772400" cy="10058400"/>
   <p:defaultTextStyle>
     <a:defPPr>
       <a:defRPr lang="ko-KR"/>
     </a:defPPr>
-    <a:lvl1pPr marL="0" algn="l" defTabSz="563377" rtl="0" eaLnBrk="1" latinLnBrk="1" hangingPunct="1">
-      <a:defRPr sz="1109" kern="1200">
+    <a:lvl1pPr marL="0" algn="l" defTabSz="531603" rtl="0" eaLnBrk="1" latinLnBrk="1" hangingPunct="1">
+      <a:defRPr sz="1046" kern="1200">
         <a:solidFill>
           <a:schemeClr val="tx1"/>
         </a:solidFill>
@@ -26,8 +27,8 @@
         <a:cs typeface="+mn-cs"/>
       </a:defRPr>
     </a:lvl1pPr>
-    <a:lvl2pPr marL="281688" algn="l" defTabSz="563377" rtl="0" eaLnBrk="1" latinLnBrk="1" hangingPunct="1">
-      <a:defRPr sz="1109" kern="1200">
+    <a:lvl2pPr marL="265801" algn="l" defTabSz="531603" rtl="0" eaLnBrk="1" latinLnBrk="1" hangingPunct="1">
+      <a:defRPr sz="1046" kern="1200">
         <a:solidFill>
           <a:schemeClr val="tx1"/>
         </a:solidFill>
@@ -36,8 +37,8 @@
         <a:cs typeface="+mn-cs"/>
       </a:defRPr>
     </a:lvl2pPr>
-    <a:lvl3pPr marL="563377" algn="l" defTabSz="563377" rtl="0" eaLnBrk="1" latinLnBrk="1" hangingPunct="1">
-      <a:defRPr sz="1109" kern="1200">
+    <a:lvl3pPr marL="531603" algn="l" defTabSz="531603" rtl="0" eaLnBrk="1" latinLnBrk="1" hangingPunct="1">
+      <a:defRPr sz="1046" kern="1200">
         <a:solidFill>
           <a:schemeClr val="tx1"/>
         </a:solidFill>
@@ -46,8 +47,8 @@
         <a:cs typeface="+mn-cs"/>
       </a:defRPr>
     </a:lvl3pPr>
-    <a:lvl4pPr marL="845065" algn="l" defTabSz="563377" rtl="0" eaLnBrk="1" latinLnBrk="1" hangingPunct="1">
-      <a:defRPr sz="1109" kern="1200">
+    <a:lvl4pPr marL="797403" algn="l" defTabSz="531603" rtl="0" eaLnBrk="1" latinLnBrk="1" hangingPunct="1">
+      <a:defRPr sz="1046" kern="1200">
         <a:solidFill>
           <a:schemeClr val="tx1"/>
         </a:solidFill>
@@ -56,8 +57,8 @@
         <a:cs typeface="+mn-cs"/>
       </a:defRPr>
     </a:lvl4pPr>
-    <a:lvl5pPr marL="1126753" algn="l" defTabSz="563377" rtl="0" eaLnBrk="1" latinLnBrk="1" hangingPunct="1">
-      <a:defRPr sz="1109" kern="1200">
+    <a:lvl5pPr marL="1063204" algn="l" defTabSz="531603" rtl="0" eaLnBrk="1" latinLnBrk="1" hangingPunct="1">
+      <a:defRPr sz="1046" kern="1200">
         <a:solidFill>
           <a:schemeClr val="tx1"/>
         </a:solidFill>
@@ -66,8 +67,8 @@
         <a:cs typeface="+mn-cs"/>
       </a:defRPr>
     </a:lvl5pPr>
-    <a:lvl6pPr marL="1408441" algn="l" defTabSz="563377" rtl="0" eaLnBrk="1" latinLnBrk="1" hangingPunct="1">
-      <a:defRPr sz="1109" kern="1200">
+    <a:lvl6pPr marL="1329005" algn="l" defTabSz="531603" rtl="0" eaLnBrk="1" latinLnBrk="1" hangingPunct="1">
+      <a:defRPr sz="1046" kern="1200">
         <a:solidFill>
           <a:schemeClr val="tx1"/>
         </a:solidFill>
@@ -76,8 +77,8 @@
         <a:cs typeface="+mn-cs"/>
       </a:defRPr>
     </a:lvl6pPr>
-    <a:lvl7pPr marL="1690130" algn="l" defTabSz="563377" rtl="0" eaLnBrk="1" latinLnBrk="1" hangingPunct="1">
-      <a:defRPr sz="1109" kern="1200">
+    <a:lvl7pPr marL="1594807" algn="l" defTabSz="531603" rtl="0" eaLnBrk="1" latinLnBrk="1" hangingPunct="1">
+      <a:defRPr sz="1046" kern="1200">
         <a:solidFill>
           <a:schemeClr val="tx1"/>
         </a:solidFill>
@@ -86,8 +87,8 @@
         <a:cs typeface="+mn-cs"/>
       </a:defRPr>
     </a:lvl7pPr>
-    <a:lvl8pPr marL="1971818" algn="l" defTabSz="563377" rtl="0" eaLnBrk="1" latinLnBrk="1" hangingPunct="1">
-      <a:defRPr sz="1109" kern="1200">
+    <a:lvl8pPr marL="1860607" algn="l" defTabSz="531603" rtl="0" eaLnBrk="1" latinLnBrk="1" hangingPunct="1">
+      <a:defRPr sz="1046" kern="1200">
         <a:solidFill>
           <a:schemeClr val="tx1"/>
         </a:solidFill>
@@ -96,8 +97,8 @@
         <a:cs typeface="+mn-cs"/>
       </a:defRPr>
     </a:lvl8pPr>
-    <a:lvl9pPr marL="2253506" algn="l" defTabSz="563377" rtl="0" eaLnBrk="1" latinLnBrk="1" hangingPunct="1">
-      <a:defRPr sz="1109" kern="1200">
+    <a:lvl9pPr marL="2126408" algn="l" defTabSz="531603" rtl="0" eaLnBrk="1" latinLnBrk="1" hangingPunct="1">
+      <a:defRPr sz="1046" kern="1200">
         <a:solidFill>
           <a:schemeClr val="tx1"/>
         </a:solidFill>
@@ -197,7 +198,7 @@
           <a:p>
             <a:fld id="{0903332B-846A-4D2B-8B67-F9309C5158BD}" type="datetimeFigureOut">
               <a:rPr lang="ko-KR" altLang="en-US" smtClean="0"/>
-              <a:t>2024. 8. 31.</a:t>
+              <a:t>2024. 9. 14.</a:t>
             </a:fld>
             <a:endParaRPr lang="ko-KR" altLang="en-US"/>
           </a:p>
@@ -215,8 +216,8 @@
         </p:nvSpPr>
         <p:spPr>
           <a:xfrm>
-            <a:off x="2312988" y="1257300"/>
-            <a:ext cx="3146425" cy="3394075"/>
+            <a:off x="2189163" y="1257300"/>
+            <a:ext cx="3394075" cy="3394075"/>
           </a:xfrm>
           <a:prstGeom prst="rect">
             <a:avLst/>
@@ -370,8 +371,8 @@
   </p:cSld>
   <p:clrMap bg1="lt1" tx1="dk1" bg2="lt2" tx2="dk2" accent1="accent1" accent2="accent2" accent3="accent3" accent4="accent4" accent5="accent5" accent6="accent6" hlink="hlink" folHlink="folHlink"/>
   <p:notesStyle>
-    <a:lvl1pPr marL="0" algn="l" defTabSz="834756" rtl="0" eaLnBrk="1" latinLnBrk="1" hangingPunct="1">
-      <a:defRPr sz="1095" kern="1200">
+    <a:lvl1pPr marL="0" algn="l" defTabSz="787676" rtl="0" eaLnBrk="1" latinLnBrk="1" hangingPunct="1">
+      <a:defRPr sz="1033" kern="1200">
         <a:solidFill>
           <a:schemeClr val="tx1"/>
         </a:solidFill>
@@ -380,8 +381,8 @@
         <a:cs typeface="+mn-cs"/>
       </a:defRPr>
     </a:lvl1pPr>
-    <a:lvl2pPr marL="417378" algn="l" defTabSz="834756" rtl="0" eaLnBrk="1" latinLnBrk="1" hangingPunct="1">
-      <a:defRPr sz="1095" kern="1200">
+    <a:lvl2pPr marL="393838" algn="l" defTabSz="787676" rtl="0" eaLnBrk="1" latinLnBrk="1" hangingPunct="1">
+      <a:defRPr sz="1033" kern="1200">
         <a:solidFill>
           <a:schemeClr val="tx1"/>
         </a:solidFill>
@@ -390,8 +391,8 @@
         <a:cs typeface="+mn-cs"/>
       </a:defRPr>
     </a:lvl2pPr>
-    <a:lvl3pPr marL="834756" algn="l" defTabSz="834756" rtl="0" eaLnBrk="1" latinLnBrk="1" hangingPunct="1">
-      <a:defRPr sz="1095" kern="1200">
+    <a:lvl3pPr marL="787676" algn="l" defTabSz="787676" rtl="0" eaLnBrk="1" latinLnBrk="1" hangingPunct="1">
+      <a:defRPr sz="1033" kern="1200">
         <a:solidFill>
           <a:schemeClr val="tx1"/>
         </a:solidFill>
@@ -400,8 +401,8 @@
         <a:cs typeface="+mn-cs"/>
       </a:defRPr>
     </a:lvl3pPr>
-    <a:lvl4pPr marL="1252134" algn="l" defTabSz="834756" rtl="0" eaLnBrk="1" latinLnBrk="1" hangingPunct="1">
-      <a:defRPr sz="1095" kern="1200">
+    <a:lvl4pPr marL="1181514" algn="l" defTabSz="787676" rtl="0" eaLnBrk="1" latinLnBrk="1" hangingPunct="1">
+      <a:defRPr sz="1033" kern="1200">
         <a:solidFill>
           <a:schemeClr val="tx1"/>
         </a:solidFill>
@@ -410,8 +411,8 @@
         <a:cs typeface="+mn-cs"/>
       </a:defRPr>
     </a:lvl4pPr>
-    <a:lvl5pPr marL="1669512" algn="l" defTabSz="834756" rtl="0" eaLnBrk="1" latinLnBrk="1" hangingPunct="1">
-      <a:defRPr sz="1095" kern="1200">
+    <a:lvl5pPr marL="1575352" algn="l" defTabSz="787676" rtl="0" eaLnBrk="1" latinLnBrk="1" hangingPunct="1">
+      <a:defRPr sz="1033" kern="1200">
         <a:solidFill>
           <a:schemeClr val="tx1"/>
         </a:solidFill>
@@ -420,8 +421,8 @@
         <a:cs typeface="+mn-cs"/>
       </a:defRPr>
     </a:lvl5pPr>
-    <a:lvl6pPr marL="2086889" algn="l" defTabSz="834756" rtl="0" eaLnBrk="1" latinLnBrk="1" hangingPunct="1">
-      <a:defRPr sz="1095" kern="1200">
+    <a:lvl6pPr marL="1969188" algn="l" defTabSz="787676" rtl="0" eaLnBrk="1" latinLnBrk="1" hangingPunct="1">
+      <a:defRPr sz="1033" kern="1200">
         <a:solidFill>
           <a:schemeClr val="tx1"/>
         </a:solidFill>
@@ -430,8 +431,8 @@
         <a:cs typeface="+mn-cs"/>
       </a:defRPr>
     </a:lvl6pPr>
-    <a:lvl7pPr marL="2504267" algn="l" defTabSz="834756" rtl="0" eaLnBrk="1" latinLnBrk="1" hangingPunct="1">
-      <a:defRPr sz="1095" kern="1200">
+    <a:lvl7pPr marL="2363026" algn="l" defTabSz="787676" rtl="0" eaLnBrk="1" latinLnBrk="1" hangingPunct="1">
+      <a:defRPr sz="1033" kern="1200">
         <a:solidFill>
           <a:schemeClr val="tx1"/>
         </a:solidFill>
@@ -440,8 +441,8 @@
         <a:cs typeface="+mn-cs"/>
       </a:defRPr>
     </a:lvl7pPr>
-    <a:lvl8pPr marL="2921645" algn="l" defTabSz="834756" rtl="0" eaLnBrk="1" latinLnBrk="1" hangingPunct="1">
-      <a:defRPr sz="1095" kern="1200">
+    <a:lvl8pPr marL="2756864" algn="l" defTabSz="787676" rtl="0" eaLnBrk="1" latinLnBrk="1" hangingPunct="1">
+      <a:defRPr sz="1033" kern="1200">
         <a:solidFill>
           <a:schemeClr val="tx1"/>
         </a:solidFill>
@@ -450,8 +451,8 @@
         <a:cs typeface="+mn-cs"/>
       </a:defRPr>
     </a:lvl8pPr>
-    <a:lvl9pPr marL="3339023" algn="l" defTabSz="834756" rtl="0" eaLnBrk="1" latinLnBrk="1" hangingPunct="1">
-      <a:defRPr sz="1095" kern="1200">
+    <a:lvl9pPr marL="3150702" algn="l" defTabSz="787676" rtl="0" eaLnBrk="1" latinLnBrk="1" hangingPunct="1">
+      <a:defRPr sz="1033" kern="1200">
         <a:solidFill>
           <a:schemeClr val="tx1"/>
         </a:solidFill>
@@ -493,8 +494,8 @@
         </p:nvSpPr>
         <p:spPr>
           <a:xfrm>
-            <a:off x="2312988" y="1257300"/>
-            <a:ext cx="3146425" cy="3394075"/>
+            <a:off x="2189163" y="1257300"/>
+            <a:ext cx="3394075" cy="3394075"/>
           </a:xfrm>
         </p:spPr>
       </p:sp>
@@ -544,6 +545,119 @@
     <p:extLst>
       <p:ext uri="{BB962C8B-B14F-4D97-AF65-F5344CB8AC3E}">
         <p14:creationId xmlns:p14="http://schemas.microsoft.com/office/powerpoint/2010/main" val="514967911"/>
+      </p:ext>
+    </p:extLst>
+  </p:cSld>
+  <p:clrMapOvr>
+    <a:masterClrMapping/>
+  </p:clrMapOvr>
+</p:notes>
+</file>
+
+<file path=ppt/notesSlides/notesSlide2.xml><?xml version="1.0" encoding="utf-8"?>
+<p:notes xmlns:a="http://schemas.openxmlformats.org/drawingml/2006/main" xmlns:r="http://schemas.openxmlformats.org/officeDocument/2006/relationships" xmlns:p="http://schemas.openxmlformats.org/presentationml/2006/main">
+  <p:cSld>
+    <p:spTree>
+      <p:nvGrpSpPr>
+        <p:cNvPr id="1" name="">
+          <a:extLst>
+            <a:ext uri="{FF2B5EF4-FFF2-40B4-BE49-F238E27FC236}">
+              <a16:creationId xmlns:a16="http://schemas.microsoft.com/office/drawing/2014/main" id="{037DE138-CF20-3446-D90A-08D81B74A4A1}"/>
+            </a:ext>
+          </a:extLst>
+        </p:cNvPr>
+        <p:cNvGrpSpPr/>
+        <p:nvPr/>
+      </p:nvGrpSpPr>
+      <p:grpSpPr>
+        <a:xfrm>
+          <a:off x="0" y="0"/>
+          <a:ext cx="0" cy="0"/>
+          <a:chOff x="0" y="0"/>
+          <a:chExt cx="0" cy="0"/>
+        </a:xfrm>
+      </p:grpSpPr>
+      <p:sp>
+        <p:nvSpPr>
+          <p:cNvPr id="2" name="슬라이드 이미지 개체 틀 1">
+            <a:extLst>
+              <a:ext uri="{FF2B5EF4-FFF2-40B4-BE49-F238E27FC236}">
+                <a16:creationId xmlns:a16="http://schemas.microsoft.com/office/drawing/2014/main" id="{16965E2C-6629-0224-154C-E09FDAA26CF9}"/>
+              </a:ext>
+            </a:extLst>
+          </p:cNvPr>
+          <p:cNvSpPr>
+            <a:spLocks noGrp="1" noRot="1" noChangeAspect="1"/>
+          </p:cNvSpPr>
+          <p:nvPr>
+            <p:ph type="sldImg"/>
+          </p:nvPr>
+        </p:nvSpPr>
+        <p:spPr>
+          <a:xfrm>
+            <a:off x="2189163" y="1257300"/>
+            <a:ext cx="3394075" cy="3394075"/>
+          </a:xfrm>
+        </p:spPr>
+      </p:sp>
+      <p:sp>
+        <p:nvSpPr>
+          <p:cNvPr id="3" name="슬라이드 노트 개체 틀 2">
+            <a:extLst>
+              <a:ext uri="{FF2B5EF4-FFF2-40B4-BE49-F238E27FC236}">
+                <a16:creationId xmlns:a16="http://schemas.microsoft.com/office/drawing/2014/main" id="{63D7499C-A65A-3E73-8F52-A9CB93F07EBC}"/>
+              </a:ext>
+            </a:extLst>
+          </p:cNvPr>
+          <p:cNvSpPr>
+            <a:spLocks noGrp="1"/>
+          </p:cNvSpPr>
+          <p:nvPr>
+            <p:ph type="body" idx="1"/>
+          </p:nvPr>
+        </p:nvSpPr>
+        <p:spPr/>
+        <p:txBody>
+          <a:bodyPr/>
+          <a:lstStyle/>
+          <a:p>
+            <a:endParaRPr lang="ko-KR" altLang="en-US" dirty="0"/>
+          </a:p>
+        </p:txBody>
+      </p:sp>
+      <p:sp>
+        <p:nvSpPr>
+          <p:cNvPr id="4" name="슬라이드 번호 개체 틀 3">
+            <a:extLst>
+              <a:ext uri="{FF2B5EF4-FFF2-40B4-BE49-F238E27FC236}">
+                <a16:creationId xmlns:a16="http://schemas.microsoft.com/office/drawing/2014/main" id="{2F748690-FD4C-87A0-5E9D-010828B5D172}"/>
+              </a:ext>
+            </a:extLst>
+          </p:cNvPr>
+          <p:cNvSpPr>
+            <a:spLocks noGrp="1"/>
+          </p:cNvSpPr>
+          <p:nvPr>
+            <p:ph type="sldNum" sz="quarter" idx="5"/>
+          </p:nvPr>
+        </p:nvSpPr>
+        <p:spPr/>
+        <p:txBody>
+          <a:bodyPr/>
+          <a:lstStyle/>
+          <a:p>
+            <a:fld id="{419759C8-8117-4BBC-AD53-31FC836FAE87}" type="slidenum">
+              <a:rPr lang="ko-KR" altLang="en-US" smtClean="0"/>
+              <a:t>2</a:t>
+            </a:fld>
+            <a:endParaRPr lang="ko-KR" altLang="en-US"/>
+          </a:p>
+        </p:txBody>
+      </p:sp>
+    </p:spTree>
+    <p:extLst>
+      <p:ext uri="{BB962C8B-B14F-4D97-AF65-F5344CB8AC3E}">
+        <p14:creationId xmlns:p14="http://schemas.microsoft.com/office/powerpoint/2010/main" val="3294785734"/>
       </p:ext>
     </p:extLst>
   </p:cSld>
@@ -607,8 +721,8 @@
         </p:nvSpPr>
         <p:spPr>
           <a:xfrm>
-            <a:off x="183598" y="157953"/>
-            <a:ext cx="3304554" cy="660910"/>
+            <a:off x="180026" y="143640"/>
+            <a:ext cx="3240263" cy="601020"/>
           </a:xfrm>
           <a:prstGeom prst="rect">
             <a:avLst/>
@@ -637,8 +751,8 @@
         </p:nvSpPr>
         <p:spPr>
           <a:xfrm>
-            <a:off x="183598" y="926317"/>
-            <a:ext cx="3304554" cy="1095074"/>
+            <a:off x="180026" y="842377"/>
+            <a:ext cx="3240263" cy="995841"/>
           </a:xfrm>
           <a:prstGeom prst="rect">
             <a:avLst/>
@@ -668,8 +782,8 @@
         </p:nvSpPr>
         <p:spPr>
           <a:xfrm>
-            <a:off x="183598" y="2125722"/>
-            <a:ext cx="3304554" cy="1095074"/>
+            <a:off x="180026" y="1933095"/>
+            <a:ext cx="3240263" cy="995841"/>
           </a:xfrm>
           <a:prstGeom prst="rect">
             <a:avLst/>
@@ -724,8 +838,8 @@
         </p:nvSpPr>
         <p:spPr>
           <a:xfrm>
-            <a:off x="183598" y="157953"/>
-            <a:ext cx="3304554" cy="660910"/>
+            <a:off x="180026" y="143640"/>
+            <a:ext cx="3240263" cy="601020"/>
           </a:xfrm>
           <a:prstGeom prst="rect">
             <a:avLst/>
@@ -754,8 +868,8 @@
         </p:nvSpPr>
         <p:spPr>
           <a:xfrm>
-            <a:off x="183595" y="926317"/>
-            <a:ext cx="1612595" cy="1095074"/>
+            <a:off x="180024" y="842377"/>
+            <a:ext cx="1581221" cy="995841"/>
           </a:xfrm>
           <a:prstGeom prst="rect">
             <a:avLst/>
@@ -785,8 +899,8 @@
         </p:nvSpPr>
         <p:spPr>
           <a:xfrm>
-            <a:off x="1877000" y="926317"/>
-            <a:ext cx="1612595" cy="1095074"/>
+            <a:off x="1840483" y="842377"/>
+            <a:ext cx="1581221" cy="995841"/>
           </a:xfrm>
           <a:prstGeom prst="rect">
             <a:avLst/>
@@ -816,8 +930,8 @@
         </p:nvSpPr>
         <p:spPr>
           <a:xfrm>
-            <a:off x="183595" y="2125722"/>
-            <a:ext cx="1612595" cy="1095074"/>
+            <a:off x="180024" y="1933095"/>
+            <a:ext cx="1581221" cy="995841"/>
           </a:xfrm>
           <a:prstGeom prst="rect">
             <a:avLst/>
@@ -847,8 +961,8 @@
         </p:nvSpPr>
         <p:spPr>
           <a:xfrm>
-            <a:off x="1877000" y="2125722"/>
-            <a:ext cx="1612595" cy="1095074"/>
+            <a:off x="1840483" y="1933095"/>
+            <a:ext cx="1581221" cy="995841"/>
           </a:xfrm>
           <a:prstGeom prst="rect">
             <a:avLst/>
@@ -903,8 +1017,8 @@
         </p:nvSpPr>
         <p:spPr>
           <a:xfrm>
-            <a:off x="183598" y="157953"/>
-            <a:ext cx="3304554" cy="660910"/>
+            <a:off x="180026" y="143640"/>
+            <a:ext cx="3240263" cy="601020"/>
           </a:xfrm>
           <a:prstGeom prst="rect">
             <a:avLst/>
@@ -933,8 +1047,8 @@
         </p:nvSpPr>
         <p:spPr>
           <a:xfrm>
-            <a:off x="183594" y="926317"/>
-            <a:ext cx="1063980" cy="1095074"/>
+            <a:off x="180022" y="842377"/>
+            <a:ext cx="1043280" cy="995841"/>
           </a:xfrm>
           <a:prstGeom prst="rect">
             <a:avLst/>
@@ -964,8 +1078,8 @@
         </p:nvSpPr>
         <p:spPr>
           <a:xfrm>
-            <a:off x="1300918" y="926317"/>
-            <a:ext cx="1063980" cy="1095074"/>
+            <a:off x="1275608" y="842377"/>
+            <a:ext cx="1043280" cy="995841"/>
           </a:xfrm>
           <a:prstGeom prst="rect">
             <a:avLst/>
@@ -995,8 +1109,8 @@
         </p:nvSpPr>
         <p:spPr>
           <a:xfrm>
-            <a:off x="2418242" y="926317"/>
-            <a:ext cx="1063980" cy="1095074"/>
+            <a:off x="2371194" y="842377"/>
+            <a:ext cx="1043280" cy="995841"/>
           </a:xfrm>
           <a:prstGeom prst="rect">
             <a:avLst/>
@@ -1026,8 +1140,8 @@
         </p:nvSpPr>
         <p:spPr>
           <a:xfrm>
-            <a:off x="183594" y="2125722"/>
-            <a:ext cx="1063980" cy="1095074"/>
+            <a:off x="180022" y="1933095"/>
+            <a:ext cx="1043280" cy="995841"/>
           </a:xfrm>
           <a:prstGeom prst="rect">
             <a:avLst/>
@@ -1057,8 +1171,8 @@
         </p:nvSpPr>
         <p:spPr>
           <a:xfrm>
-            <a:off x="1300918" y="2125722"/>
-            <a:ext cx="1063980" cy="1095074"/>
+            <a:off x="1275608" y="1933095"/>
+            <a:ext cx="1043280" cy="995841"/>
           </a:xfrm>
           <a:prstGeom prst="rect">
             <a:avLst/>
@@ -1088,8 +1202,8 @@
         </p:nvSpPr>
         <p:spPr>
           <a:xfrm>
-            <a:off x="2418242" y="2125722"/>
-            <a:ext cx="1063980" cy="1095074"/>
+            <a:off x="2371194" y="1933095"/>
+            <a:ext cx="1043280" cy="995841"/>
           </a:xfrm>
           <a:prstGeom prst="rect">
             <a:avLst/>
@@ -1144,8 +1258,8 @@
         </p:nvSpPr>
         <p:spPr>
           <a:xfrm>
-            <a:off x="183598" y="157953"/>
-            <a:ext cx="3304554" cy="660910"/>
+            <a:off x="180026" y="143640"/>
+            <a:ext cx="3240263" cy="601020"/>
           </a:xfrm>
           <a:prstGeom prst="rect">
             <a:avLst/>
@@ -1174,8 +1288,8 @@
         </p:nvSpPr>
         <p:spPr>
           <a:xfrm>
-            <a:off x="183598" y="926318"/>
-            <a:ext cx="3304554" cy="2296143"/>
+            <a:off x="180026" y="842378"/>
+            <a:ext cx="3240263" cy="2088072"/>
           </a:xfrm>
           <a:prstGeom prst="rect">
             <a:avLst/>
@@ -1229,8 +1343,8 @@
         </p:nvSpPr>
         <p:spPr>
           <a:xfrm>
-            <a:off x="183598" y="157953"/>
-            <a:ext cx="3304554" cy="660910"/>
+            <a:off x="180026" y="143640"/>
+            <a:ext cx="3240263" cy="601020"/>
           </a:xfrm>
           <a:prstGeom prst="rect">
             <a:avLst/>
@@ -1259,8 +1373,8 @@
         </p:nvSpPr>
         <p:spPr>
           <a:xfrm>
-            <a:off x="183598" y="926318"/>
-            <a:ext cx="3304554" cy="2296143"/>
+            <a:off x="180026" y="842378"/>
+            <a:ext cx="3240263" cy="2088072"/>
           </a:xfrm>
           <a:prstGeom prst="rect">
             <a:avLst/>
@@ -1315,8 +1429,8 @@
         </p:nvSpPr>
         <p:spPr>
           <a:xfrm>
-            <a:off x="183598" y="157953"/>
-            <a:ext cx="3304554" cy="660910"/>
+            <a:off x="180026" y="143640"/>
+            <a:ext cx="3240263" cy="601020"/>
           </a:xfrm>
           <a:prstGeom prst="rect">
             <a:avLst/>
@@ -1345,8 +1459,8 @@
         </p:nvSpPr>
         <p:spPr>
           <a:xfrm>
-            <a:off x="183595" y="926318"/>
-            <a:ext cx="1612595" cy="2296143"/>
+            <a:off x="180024" y="842378"/>
+            <a:ext cx="1581221" cy="2088072"/>
           </a:xfrm>
           <a:prstGeom prst="rect">
             <a:avLst/>
@@ -1376,8 +1490,8 @@
         </p:nvSpPr>
         <p:spPr>
           <a:xfrm>
-            <a:off x="1877000" y="926318"/>
-            <a:ext cx="1612595" cy="2296143"/>
+            <a:off x="1840483" y="842378"/>
+            <a:ext cx="1581221" cy="2088072"/>
           </a:xfrm>
           <a:prstGeom prst="rect">
             <a:avLst/>
@@ -1432,8 +1546,8 @@
         </p:nvSpPr>
         <p:spPr>
           <a:xfrm>
-            <a:off x="183598" y="157953"/>
-            <a:ext cx="3304554" cy="660910"/>
+            <a:off x="180026" y="143640"/>
+            <a:ext cx="3240263" cy="601020"/>
           </a:xfrm>
           <a:prstGeom prst="rect">
             <a:avLst/>
@@ -1487,8 +1601,8 @@
         </p:nvSpPr>
         <p:spPr>
           <a:xfrm>
-            <a:off x="183598" y="157960"/>
-            <a:ext cx="3304554" cy="3064295"/>
+            <a:off x="180026" y="143647"/>
+            <a:ext cx="3240263" cy="2786616"/>
           </a:xfrm>
           <a:prstGeom prst="rect">
             <a:avLst/>
@@ -1542,8 +1656,8 @@
         </p:nvSpPr>
         <p:spPr>
           <a:xfrm>
-            <a:off x="183598" y="157953"/>
-            <a:ext cx="3304554" cy="660910"/>
+            <a:off x="180026" y="143640"/>
+            <a:ext cx="3240263" cy="601020"/>
           </a:xfrm>
           <a:prstGeom prst="rect">
             <a:avLst/>
@@ -1572,8 +1686,8 @@
         </p:nvSpPr>
         <p:spPr>
           <a:xfrm>
-            <a:off x="183595" y="926317"/>
-            <a:ext cx="1612595" cy="1095074"/>
+            <a:off x="180024" y="842377"/>
+            <a:ext cx="1581221" cy="995841"/>
           </a:xfrm>
           <a:prstGeom prst="rect">
             <a:avLst/>
@@ -1603,8 +1717,8 @@
         </p:nvSpPr>
         <p:spPr>
           <a:xfrm>
-            <a:off x="1877000" y="926318"/>
-            <a:ext cx="1612595" cy="2296143"/>
+            <a:off x="1840483" y="842378"/>
+            <a:ext cx="1581221" cy="2088072"/>
           </a:xfrm>
           <a:prstGeom prst="rect">
             <a:avLst/>
@@ -1634,8 +1748,8 @@
         </p:nvSpPr>
         <p:spPr>
           <a:xfrm>
-            <a:off x="183595" y="2125722"/>
-            <a:ext cx="1612595" cy="1095074"/>
+            <a:off x="180024" y="1933095"/>
+            <a:ext cx="1581221" cy="995841"/>
           </a:xfrm>
           <a:prstGeom prst="rect">
             <a:avLst/>
@@ -1690,8 +1804,8 @@
         </p:nvSpPr>
         <p:spPr>
           <a:xfrm>
-            <a:off x="183598" y="157953"/>
-            <a:ext cx="3304554" cy="660910"/>
+            <a:off x="180026" y="143640"/>
+            <a:ext cx="3240263" cy="601020"/>
           </a:xfrm>
           <a:prstGeom prst="rect">
             <a:avLst/>
@@ -1720,8 +1834,8 @@
         </p:nvSpPr>
         <p:spPr>
           <a:xfrm>
-            <a:off x="183595" y="926318"/>
-            <a:ext cx="1612595" cy="2296143"/>
+            <a:off x="180024" y="842378"/>
+            <a:ext cx="1581221" cy="2088072"/>
           </a:xfrm>
           <a:prstGeom prst="rect">
             <a:avLst/>
@@ -1751,8 +1865,8 @@
         </p:nvSpPr>
         <p:spPr>
           <a:xfrm>
-            <a:off x="1877000" y="926317"/>
-            <a:ext cx="1612595" cy="1095074"/>
+            <a:off x="1840483" y="842377"/>
+            <a:ext cx="1581221" cy="995841"/>
           </a:xfrm>
           <a:prstGeom prst="rect">
             <a:avLst/>
@@ -1782,8 +1896,8 @@
         </p:nvSpPr>
         <p:spPr>
           <a:xfrm>
-            <a:off x="1877000" y="2125722"/>
-            <a:ext cx="1612595" cy="1095074"/>
+            <a:off x="1840483" y="1933095"/>
+            <a:ext cx="1581221" cy="995841"/>
           </a:xfrm>
           <a:prstGeom prst="rect">
             <a:avLst/>
@@ -1838,8 +1952,8 @@
         </p:nvSpPr>
         <p:spPr>
           <a:xfrm>
-            <a:off x="183598" y="157953"/>
-            <a:ext cx="3304554" cy="660910"/>
+            <a:off x="180026" y="143640"/>
+            <a:ext cx="3240263" cy="601020"/>
           </a:xfrm>
           <a:prstGeom prst="rect">
             <a:avLst/>
@@ -1868,8 +1982,8 @@
         </p:nvSpPr>
         <p:spPr>
           <a:xfrm>
-            <a:off x="183595" y="926317"/>
-            <a:ext cx="1612595" cy="1095074"/>
+            <a:off x="180024" y="842377"/>
+            <a:ext cx="1581221" cy="995841"/>
           </a:xfrm>
           <a:prstGeom prst="rect">
             <a:avLst/>
@@ -1899,8 +2013,8 @@
         </p:nvSpPr>
         <p:spPr>
           <a:xfrm>
-            <a:off x="1877000" y="926317"/>
-            <a:ext cx="1612595" cy="1095074"/>
+            <a:off x="1840483" y="842377"/>
+            <a:ext cx="1581221" cy="995841"/>
           </a:xfrm>
           <a:prstGeom prst="rect">
             <a:avLst/>
@@ -1930,8 +2044,8 @@
         </p:nvSpPr>
         <p:spPr>
           <a:xfrm>
-            <a:off x="183598" y="2125722"/>
-            <a:ext cx="3304554" cy="1095074"/>
+            <a:off x="180026" y="1933095"/>
+            <a:ext cx="3240263" cy="995841"/>
           </a:xfrm>
           <a:prstGeom prst="rect">
             <a:avLst/>
@@ -1991,7 +2105,7 @@
         <p:spPr>
           <a:xfrm>
             <a:off x="0" y="4"/>
-            <a:ext cx="57825" cy="3959225"/>
+            <a:ext cx="56700" cy="3600450"/>
           </a:xfrm>
           <a:prstGeom prst="rect">
             <a:avLst/>
@@ -2024,8 +2138,8 @@
         </p:nvSpPr>
         <p:spPr>
           <a:xfrm>
-            <a:off x="0" y="10"/>
-            <a:ext cx="57825" cy="691877"/>
+            <a:off x="0" y="9"/>
+            <a:ext cx="56700" cy="629181"/>
           </a:xfrm>
           <a:prstGeom prst="rect">
             <a:avLst/>
@@ -2367,12 +2481,105 @@
           <a:chExt cx="0" cy="0"/>
         </a:xfrm>
       </p:grpSpPr>
+      <p:pic>
+        <p:nvPicPr>
+          <p:cNvPr id="17" name="Main graphic">
+            <a:extLst>
+              <a:ext uri="{FF2B5EF4-FFF2-40B4-BE49-F238E27FC236}">
+                <a16:creationId xmlns:a16="http://schemas.microsoft.com/office/drawing/2014/main" id="{2BB86BA3-82D8-2B15-43D9-B34E8E289B0B}"/>
+              </a:ext>
+            </a:extLst>
+          </p:cNvPr>
+          <p:cNvPicPr>
+            <a:picLocks/>
+          </p:cNvPicPr>
+          <p:nvPr/>
+        </p:nvPicPr>
+        <p:blipFill>
+          <a:blip r:embed="rId3"/>
+          <a:srcRect l="54629"/>
+          <a:stretch/>
+        </p:blipFill>
+        <p:spPr>
+          <a:xfrm>
+            <a:off x="450" y="450"/>
+            <a:ext cx="3600000" cy="3600000"/>
+          </a:xfrm>
+          <a:prstGeom prst="rect">
+            <a:avLst/>
+          </a:prstGeom>
+          <a:ln>
+            <a:noFill/>
+          </a:ln>
+        </p:spPr>
+      </p:pic>
+    </p:spTree>
+  </p:cSld>
+  <p:clrMapOvr>
+    <a:masterClrMapping/>
+  </p:clrMapOvr>
+  <p:transition>
+    <p:wipe dir="r"/>
+  </p:transition>
+  <p:timing>
+    <p:tnLst>
+      <p:par>
+        <p:cTn id="1" dur="indefinite" restart="never" nodeType="tmRoot">
+          <p:childTnLst>
+            <p:seq>
+              <p:cTn id="2" dur="indefinite" nodeType="mainSeq"/>
+              <p:prevCondLst>
+                <p:cond evt="onPrev" delay="0">
+                  <p:tgtEl>
+                    <p:sldTgt/>
+                  </p:tgtEl>
+                </p:cond>
+              </p:prevCondLst>
+              <p:nextCondLst>
+                <p:cond evt="onNext" delay="0">
+                  <p:tgtEl>
+                    <p:sldTgt/>
+                  </p:tgtEl>
+                </p:cond>
+              </p:nextCondLst>
+            </p:seq>
+          </p:childTnLst>
+        </p:cTn>
+      </p:par>
+    </p:tnLst>
+  </p:timing>
+</p:sld>
+</file>
+
+<file path=ppt/slides/slide2.xml><?xml version="1.0" encoding="utf-8"?>
+<p:sld xmlns:a="http://schemas.openxmlformats.org/drawingml/2006/main" xmlns:r="http://schemas.openxmlformats.org/officeDocument/2006/relationships" xmlns:p="http://schemas.openxmlformats.org/presentationml/2006/main">
+  <p:cSld>
+    <p:spTree>
+      <p:nvGrpSpPr>
+        <p:cNvPr id="1" name="">
+          <a:extLst>
+            <a:ext uri="{FF2B5EF4-FFF2-40B4-BE49-F238E27FC236}">
+              <a16:creationId xmlns:a16="http://schemas.microsoft.com/office/drawing/2014/main" id="{F0D54C20-F759-7B3A-D6ED-50304860537F}"/>
+            </a:ext>
+          </a:extLst>
+        </p:cNvPr>
+        <p:cNvGrpSpPr/>
+        <p:nvPr/>
+      </p:nvGrpSpPr>
+      <p:grpSpPr>
+        <a:xfrm>
+          <a:off x="0" y="0"/>
+          <a:ext cx="0" cy="0"/>
+          <a:chOff x="0" y="0"/>
+          <a:chExt cx="0" cy="0"/>
+        </a:xfrm>
+      </p:grpSpPr>
       <p:grpSp>
         <p:nvGrpSpPr>
           <p:cNvPr id="29" name="그룹 28">
             <a:extLst>
               <a:ext uri="{FF2B5EF4-FFF2-40B4-BE49-F238E27FC236}">
-                <a16:creationId xmlns:a16="http://schemas.microsoft.com/office/drawing/2014/main" id="{BC2FE030-906F-FF84-ED11-B74B2B4195B9}"/>
+                <a16:creationId xmlns:a16="http://schemas.microsoft.com/office/drawing/2014/main" id="{6DAAA5F5-0C8E-D9E2-0E0D-A5C669F5DD5E}"/>
               </a:ext>
             </a:extLst>
           </p:cNvPr>
@@ -2381,7 +2588,7 @@
         </p:nvGrpSpPr>
         <p:grpSpPr>
           <a:xfrm>
-            <a:off x="-11866" y="-5090"/>
+            <a:off x="-47585" y="-184477"/>
             <a:ext cx="3695621" cy="3969404"/>
             <a:chOff x="-53975" y="-10176"/>
             <a:chExt cx="3695621" cy="3969404"/>
@@ -2392,7 +2599,7 @@
             <p:cNvPr id="4" name="Main graphic">
               <a:extLst>
                 <a:ext uri="{FF2B5EF4-FFF2-40B4-BE49-F238E27FC236}">
-                  <a16:creationId xmlns:a16="http://schemas.microsoft.com/office/drawing/2014/main" id="{01784763-5E50-F1C8-7E22-C0030A8E4AFA}"/>
+                  <a16:creationId xmlns:a16="http://schemas.microsoft.com/office/drawing/2014/main" id="{8FF69BE2-B00C-B38F-CE23-FFEB767DE6A2}"/>
                 </a:ext>
               </a:extLst>
             </p:cNvPr>
@@ -2424,7 +2631,7 @@
             <p:cNvPr id="14" name="Main graphic">
               <a:extLst>
                 <a:ext uri="{FF2B5EF4-FFF2-40B4-BE49-F238E27FC236}">
-                  <a16:creationId xmlns:a16="http://schemas.microsoft.com/office/drawing/2014/main" id="{139C5BA7-06E2-4009-E7C2-FAF4AC598127}"/>
+                  <a16:creationId xmlns:a16="http://schemas.microsoft.com/office/drawing/2014/main" id="{72ACCF32-8F82-5694-0ED2-EA2569E911E2}"/>
                 </a:ext>
               </a:extLst>
             </p:cNvPr>
@@ -2454,7 +2661,7 @@
             <p:cNvPr id="10" name="Main graphic">
               <a:extLst>
                 <a:ext uri="{FF2B5EF4-FFF2-40B4-BE49-F238E27FC236}">
-                  <a16:creationId xmlns:a16="http://schemas.microsoft.com/office/drawing/2014/main" id="{B843A786-7E8C-3D5A-B293-E62BD3691B97}"/>
+                  <a16:creationId xmlns:a16="http://schemas.microsoft.com/office/drawing/2014/main" id="{988FDB2E-5724-6811-3C7A-911D0B77A350}"/>
                 </a:ext>
               </a:extLst>
             </p:cNvPr>
@@ -2484,7 +2691,7 @@
             <p:cNvPr id="17" name="Main graphic">
               <a:extLst>
                 <a:ext uri="{FF2B5EF4-FFF2-40B4-BE49-F238E27FC236}">
-                  <a16:creationId xmlns:a16="http://schemas.microsoft.com/office/drawing/2014/main" id="{2BB86BA3-82D8-2B15-43D9-B34E8E289B0B}"/>
+                  <a16:creationId xmlns:a16="http://schemas.microsoft.com/office/drawing/2014/main" id="{898806F5-6D42-449D-994E-AFB3D769C1DB}"/>
                 </a:ext>
               </a:extLst>
             </p:cNvPr>
@@ -2516,7 +2723,7 @@
             <p:cNvPr id="28" name="그룹 27">
               <a:extLst>
                 <a:ext uri="{FF2B5EF4-FFF2-40B4-BE49-F238E27FC236}">
-                  <a16:creationId xmlns:a16="http://schemas.microsoft.com/office/drawing/2014/main" id="{5D2472D7-B7E5-9BB6-DBFD-07FF15453E34}"/>
+                  <a16:creationId xmlns:a16="http://schemas.microsoft.com/office/drawing/2014/main" id="{9B0C2DFB-8408-217F-B73E-7E446FAA4855}"/>
                 </a:ext>
               </a:extLst>
             </p:cNvPr>
@@ -2538,7 +2745,7 @@
               <p:cNvPr id="26" name="Main graphic">
                 <a:extLst>
                   <a:ext uri="{FF2B5EF4-FFF2-40B4-BE49-F238E27FC236}">
-                    <a16:creationId xmlns:a16="http://schemas.microsoft.com/office/drawing/2014/main" id="{381620A2-6F77-A846-8BBB-7666CA072217}"/>
+                    <a16:creationId xmlns:a16="http://schemas.microsoft.com/office/drawing/2014/main" id="{FC4051A8-179E-193A-8032-BC897DB65573}"/>
                   </a:ext>
                 </a:extLst>
               </p:cNvPr>
@@ -2568,7 +2775,7 @@
               <p:cNvPr id="27" name="직사각형 26">
                 <a:extLst>
                   <a:ext uri="{FF2B5EF4-FFF2-40B4-BE49-F238E27FC236}">
-                    <a16:creationId xmlns:a16="http://schemas.microsoft.com/office/drawing/2014/main" id="{57865B85-D3EA-35F1-623E-EC48782E5AAA}"/>
+                    <a16:creationId xmlns:a16="http://schemas.microsoft.com/office/drawing/2014/main" id="{D5A32230-5E4A-B019-D5AA-C847900B9146}"/>
                   </a:ext>
                 </a:extLst>
               </p:cNvPr>
@@ -2618,6 +2825,11 @@
         </p:grpSp>
       </p:grpSp>
     </p:spTree>
+    <p:extLst>
+      <p:ext uri="{BB962C8B-B14F-4D97-AF65-F5344CB8AC3E}">
+        <p14:creationId xmlns:p14="http://schemas.microsoft.com/office/powerpoint/2010/main" val="3513485878"/>
+      </p:ext>
+    </p:extLst>
   </p:cSld>
   <p:clrMapOvr>
     <a:masterClrMapping/>

</xml_diff>